<commit_message>
update README and figures
</commit_message>
<xml_diff>
--- a/docs/figures.pptx
+++ b/docs/figures.pptx
@@ -8,6 +8,7 @@
     <p:sldId id="256" r:id="rId2"/>
     <p:sldId id="257" r:id="rId3"/>
     <p:sldId id="258" r:id="rId4"/>
+    <p:sldId id="259" r:id="rId5"/>
   </p:sldIdLst>
   <p:sldSz cx="12192000" cy="6858000"/>
   <p:notesSz cx="6858000" cy="9144000"/>
@@ -3745,8 +3746,13 @@
           <a:p>
             <a:r>
               <a:rPr lang="en-US" dirty="0"/>
-              <a:t>Before Conversion</a:t>
-            </a:r>
+              <a:t>Original (= Before Conversion): </a:t>
+            </a:r>
+            <a:r>
+              <a:rPr lang="en-US" dirty="0" err="1"/>
+              <a:t>htlc.js</a:t>
+            </a:r>
+            <a:endParaRPr lang="en-US" dirty="0"/>
           </a:p>
         </p:txBody>
       </p:sp>
@@ -4091,17 +4097,17 @@
           <a:p>
             <a:r>
               <a:rPr lang="en-US" dirty="0"/>
-              <a:t>EPS Conversion Client</a:t>
+              <a:t>EPS-Converted Client: htlc2.js</a:t>
             </a:r>
           </a:p>
         </p:txBody>
       </p:sp>
       <p:grpSp>
         <p:nvGrpSpPr>
-          <p:cNvPr id="21" name="グループ化 20">
-            <a:extLst>
-              <a:ext uri="{FF2B5EF4-FFF2-40B4-BE49-F238E27FC236}">
-                <a16:creationId xmlns:a16="http://schemas.microsoft.com/office/drawing/2014/main" id="{369AF915-527D-884D-BD0F-B7B99F0441C9}"/>
+          <p:cNvPr id="10" name="グループ化 9">
+            <a:extLst>
+              <a:ext uri="{FF2B5EF4-FFF2-40B4-BE49-F238E27FC236}">
+                <a16:creationId xmlns:a16="http://schemas.microsoft.com/office/drawing/2014/main" id="{37D21BA7-D0F3-1748-9EA3-A26E02F124A2}"/>
               </a:ext>
             </a:extLst>
           </p:cNvPr>
@@ -4110,217 +4116,325 @@
         </p:nvGrpSpPr>
         <p:grpSpPr>
           <a:xfrm>
-            <a:off x="2117035" y="1864391"/>
-            <a:ext cx="8299711" cy="3211489"/>
-            <a:chOff x="2117035" y="1864391"/>
-            <a:chExt cx="8299711" cy="3211489"/>
+            <a:off x="653939" y="1685967"/>
+            <a:ext cx="9762807" cy="3389913"/>
+            <a:chOff x="653939" y="1685967"/>
+            <a:chExt cx="9762807" cy="3389913"/>
           </a:xfrm>
         </p:grpSpPr>
-        <p:sp>
-          <p:nvSpPr>
-            <p:cNvPr id="20" name="角丸四角形 19">
+        <p:grpSp>
+          <p:nvGrpSpPr>
+            <p:cNvPr id="21" name="グループ化 20">
               <a:extLst>
                 <a:ext uri="{FF2B5EF4-FFF2-40B4-BE49-F238E27FC236}">
-                  <a16:creationId xmlns:a16="http://schemas.microsoft.com/office/drawing/2014/main" id="{6597BD77-2268-1142-B9FE-D9F886958A64}"/>
+                  <a16:creationId xmlns:a16="http://schemas.microsoft.com/office/drawing/2014/main" id="{369AF915-527D-884D-BD0F-B7B99F0441C9}"/>
                 </a:ext>
               </a:extLst>
             </p:cNvPr>
-            <p:cNvSpPr/>
+            <p:cNvGrpSpPr/>
             <p:nvPr/>
-          </p:nvSpPr>
-          <p:spPr>
+          </p:nvGrpSpPr>
+          <p:grpSpPr>
             <a:xfrm>
-              <a:off x="5197814" y="1864391"/>
-              <a:ext cx="5218932" cy="3211489"/>
+              <a:off x="2117035" y="1864391"/>
+              <a:ext cx="8299711" cy="3211489"/>
+              <a:chOff x="2117035" y="1864391"/>
+              <a:chExt cx="8299711" cy="3211489"/>
             </a:xfrm>
-            <a:prstGeom prst="roundRect">
-              <a:avLst/>
-            </a:prstGeom>
-          </p:spPr>
-          <p:style>
-            <a:lnRef idx="1">
-              <a:schemeClr val="accent2"/>
-            </a:lnRef>
-            <a:fillRef idx="2">
-              <a:schemeClr val="accent2"/>
-            </a:fillRef>
-            <a:effectRef idx="1">
-              <a:schemeClr val="accent2"/>
-            </a:effectRef>
-            <a:fontRef idx="minor">
-              <a:schemeClr val="dk1"/>
-            </a:fontRef>
-          </p:style>
-          <p:txBody>
-            <a:bodyPr rtlCol="0" anchor="t"/>
-            <a:lstStyle/>
-            <a:p>
-              <a:pPr algn="ctr"/>
-              <a:r>
-                <a:rPr lang="en-US" dirty="0">
-                  <a:latin typeface="Chalkboard SE" panose="03050602040202020205" pitchFamily="66" charset="0"/>
-                </a:rPr>
-                <a:t>Ledger</a:t>
-              </a:r>
-            </a:p>
-          </p:txBody>
-        </p:sp>
-        <p:sp>
-          <p:nvSpPr>
-            <p:cNvPr id="4" name="角丸四角形 3">
+          </p:grpSpPr>
+          <p:sp>
+            <p:nvSpPr>
+              <p:cNvPr id="20" name="角丸四角形 19">
+                <a:extLst>
+                  <a:ext uri="{FF2B5EF4-FFF2-40B4-BE49-F238E27FC236}">
+                    <a16:creationId xmlns:a16="http://schemas.microsoft.com/office/drawing/2014/main" id="{6597BD77-2268-1142-B9FE-D9F886958A64}"/>
+                  </a:ext>
+                </a:extLst>
+              </p:cNvPr>
+              <p:cNvSpPr/>
+              <p:nvPr/>
+            </p:nvSpPr>
+            <p:spPr>
+              <a:xfrm>
+                <a:off x="5197814" y="1864391"/>
+                <a:ext cx="5218932" cy="3211489"/>
+              </a:xfrm>
+              <a:prstGeom prst="roundRect">
+                <a:avLst/>
+              </a:prstGeom>
+            </p:spPr>
+            <p:style>
+              <a:lnRef idx="1">
+                <a:schemeClr val="accent2"/>
+              </a:lnRef>
+              <a:fillRef idx="2">
+                <a:schemeClr val="accent2"/>
+              </a:fillRef>
+              <a:effectRef idx="1">
+                <a:schemeClr val="accent2"/>
+              </a:effectRef>
+              <a:fontRef idx="minor">
+                <a:schemeClr val="dk1"/>
+              </a:fontRef>
+            </p:style>
+            <p:txBody>
+              <a:bodyPr rtlCol="0" anchor="t"/>
+              <a:lstStyle/>
+              <a:p>
+                <a:pPr algn="ctr"/>
+                <a:r>
+                  <a:rPr lang="en-US" dirty="0">
+                    <a:latin typeface="Chalkboard SE" panose="03050602040202020205" pitchFamily="66" charset="0"/>
+                  </a:rPr>
+                  <a:t>Ledger</a:t>
+                </a:r>
+              </a:p>
+            </p:txBody>
+          </p:sp>
+          <p:sp>
+            <p:nvSpPr>
+              <p:cNvPr id="4" name="角丸四角形 3">
+                <a:extLst>
+                  <a:ext uri="{FF2B5EF4-FFF2-40B4-BE49-F238E27FC236}">
+                    <a16:creationId xmlns:a16="http://schemas.microsoft.com/office/drawing/2014/main" id="{C1AAB99E-CC42-CF4B-BF27-47F0EF926F20}"/>
+                  </a:ext>
+                </a:extLst>
+              </p:cNvPr>
+              <p:cNvSpPr/>
+              <p:nvPr/>
+            </p:nvSpPr>
+            <p:spPr>
+              <a:xfrm>
+                <a:off x="2117035" y="2643809"/>
+                <a:ext cx="2276061" cy="2097156"/>
+              </a:xfrm>
+              <a:prstGeom prst="roundRect">
+                <a:avLst/>
+              </a:prstGeom>
+            </p:spPr>
+            <p:style>
+              <a:lnRef idx="1">
+                <a:schemeClr val="accent1"/>
+              </a:lnRef>
+              <a:fillRef idx="2">
+                <a:schemeClr val="accent1"/>
+              </a:fillRef>
+              <a:effectRef idx="1">
+                <a:schemeClr val="accent1"/>
+              </a:effectRef>
+              <a:fontRef idx="minor">
+                <a:schemeClr val="dk1"/>
+              </a:fontRef>
+            </p:style>
+            <p:txBody>
+              <a:bodyPr rtlCol="0" anchor="ctr"/>
+              <a:lstStyle/>
+              <a:p>
+                <a:pPr algn="ctr"/>
+                <a:r>
+                  <a:rPr lang="en-US" dirty="0">
+                    <a:latin typeface="Chalkboard SE" panose="03050602040202020205" pitchFamily="66" charset="0"/>
+                  </a:rPr>
+                  <a:t>Client</a:t>
+                </a:r>
+                <a:r>
+                  <a:rPr lang="ja-JP" altLang="en-US">
+                    <a:latin typeface="Chalkboard SE" panose="03050602040202020205" pitchFamily="66" charset="0"/>
+                  </a:rPr>
+                  <a:t> </a:t>
+                </a:r>
+                <a:r>
+                  <a:rPr lang="en-US" altLang="ja-JP" dirty="0">
+                    <a:latin typeface="Chalkboard SE" panose="03050602040202020205" pitchFamily="66" charset="0"/>
+                  </a:rPr>
+                  <a:t>code</a:t>
+                </a:r>
+                <a:br>
+                  <a:rPr lang="en-US" dirty="0">
+                    <a:latin typeface="Chalkboard SE" panose="03050602040202020205" pitchFamily="66" charset="0"/>
+                  </a:rPr>
+                </a:br>
+                <a:r>
+                  <a:rPr lang="en-US" dirty="0">
+                    <a:latin typeface="Chalkboard SE" panose="03050602040202020205" pitchFamily="66" charset="0"/>
+                  </a:rPr>
+                  <a:t>(EPS program)</a:t>
+                </a:r>
+              </a:p>
+            </p:txBody>
+          </p:sp>
+          <p:sp>
+            <p:nvSpPr>
+              <p:cNvPr id="5" name="角丸四角形 4">
+                <a:extLst>
+                  <a:ext uri="{FF2B5EF4-FFF2-40B4-BE49-F238E27FC236}">
+                    <a16:creationId xmlns:a16="http://schemas.microsoft.com/office/drawing/2014/main" id="{04E79DE5-79F0-0A40-AE76-F828E7183D83}"/>
+                  </a:ext>
+                </a:extLst>
+              </p:cNvPr>
+              <p:cNvSpPr/>
+              <p:nvPr/>
+            </p:nvSpPr>
+            <p:spPr>
+              <a:xfrm>
+                <a:off x="5539685" y="2643809"/>
+                <a:ext cx="2276061" cy="2097156"/>
+              </a:xfrm>
+              <a:prstGeom prst="roundRect">
+                <a:avLst/>
+              </a:prstGeom>
+            </p:spPr>
+            <p:style>
+              <a:lnRef idx="1">
+                <a:schemeClr val="accent6"/>
+              </a:lnRef>
+              <a:fillRef idx="2">
+                <a:schemeClr val="accent6"/>
+              </a:fillRef>
+              <a:effectRef idx="1">
+                <a:schemeClr val="accent6"/>
+              </a:effectRef>
+              <a:fontRef idx="minor">
+                <a:schemeClr val="dk1"/>
+              </a:fontRef>
+            </p:style>
+            <p:txBody>
+              <a:bodyPr rtlCol="0" anchor="ctr"/>
+              <a:lstStyle/>
+              <a:p>
+                <a:pPr algn="ctr"/>
+                <a:r>
+                  <a:rPr lang="en-US" dirty="0">
+                    <a:latin typeface="Chalkboard SE" panose="03050602040202020205" pitchFamily="66" charset="0"/>
+                  </a:rPr>
+                  <a:t>Contract</a:t>
+                </a:r>
+                <a:br>
+                  <a:rPr lang="en-US" dirty="0">
+                    <a:latin typeface="Chalkboard SE" panose="03050602040202020205" pitchFamily="66" charset="0"/>
+                  </a:rPr>
+                </a:br>
+                <a:r>
+                  <a:rPr lang="en-US" dirty="0">
+                    <a:latin typeface="Chalkboard SE" panose="03050602040202020205" pitchFamily="66" charset="0"/>
+                  </a:rPr>
+                  <a:t>(a Class with methods)</a:t>
+                </a:r>
+              </a:p>
+            </p:txBody>
+          </p:sp>
+          <p:cxnSp>
+            <p:nvCxnSpPr>
+              <p:cNvPr id="7" name="曲線コネクタ 6">
+                <a:extLst>
+                  <a:ext uri="{FF2B5EF4-FFF2-40B4-BE49-F238E27FC236}">
+                    <a16:creationId xmlns:a16="http://schemas.microsoft.com/office/drawing/2014/main" id="{D44573E3-0EC8-854C-84A3-0EE19310FD0C}"/>
+                  </a:ext>
+                </a:extLst>
+              </p:cNvPr>
+              <p:cNvCxnSpPr>
+                <a:cxnSpLocks/>
+                <a:stCxn id="4" idx="0"/>
+                <a:endCxn id="5" idx="0"/>
+              </p:cNvCxnSpPr>
+              <p:nvPr/>
+            </p:nvCxnSpPr>
+            <p:spPr>
+              <a:xfrm rot="5400000" flipH="1" flipV="1">
+                <a:off x="4966391" y="932484"/>
+                <a:ext cx="12700" cy="3422650"/>
+              </a:xfrm>
+              <a:prstGeom prst="curvedConnector3">
+                <a:avLst>
+                  <a:gd name="adj1" fmla="val 1800000"/>
+                </a:avLst>
+              </a:prstGeom>
+              <a:ln w="57150">
+                <a:solidFill>
+                  <a:schemeClr val="tx2"/>
+                </a:solidFill>
+                <a:tailEnd type="triangle"/>
+              </a:ln>
+            </p:spPr>
+            <p:style>
+              <a:lnRef idx="1">
+                <a:schemeClr val="accent1"/>
+              </a:lnRef>
+              <a:fillRef idx="0">
+                <a:schemeClr val="accent1"/>
+              </a:fillRef>
+              <a:effectRef idx="0">
+                <a:schemeClr val="accent1"/>
+              </a:effectRef>
+              <a:fontRef idx="minor">
+                <a:schemeClr val="tx1"/>
+              </a:fontRef>
+            </p:style>
+          </p:cxnSp>
+          <p:sp>
+            <p:nvSpPr>
+              <p:cNvPr id="15" name="テキスト ボックス 14">
+                <a:extLst>
+                  <a:ext uri="{FF2B5EF4-FFF2-40B4-BE49-F238E27FC236}">
+                    <a16:creationId xmlns:a16="http://schemas.microsoft.com/office/drawing/2014/main" id="{CA8BDA25-FBDF-A44F-A800-31CE06B407F7}"/>
+                  </a:ext>
+                </a:extLst>
+              </p:cNvPr>
+              <p:cNvSpPr txBox="1"/>
+              <p:nvPr/>
+            </p:nvSpPr>
+            <p:spPr>
+              <a:xfrm>
+                <a:off x="3975512" y="2009133"/>
+                <a:ext cx="1994457" cy="369332"/>
+              </a:xfrm>
+              <a:prstGeom prst="rect">
+                <a:avLst/>
+              </a:prstGeom>
+              <a:noFill/>
+            </p:spPr>
+            <p:txBody>
+              <a:bodyPr wrap="none" rtlCol="0">
+                <a:spAutoFit/>
+              </a:bodyPr>
+              <a:lstStyle/>
+              <a:p>
+                <a:pPr algn="ctr"/>
+                <a:r>
+                  <a:rPr lang="en-US" dirty="0">
+                    <a:latin typeface="Chalkboard SE" panose="03050602040202020205" pitchFamily="66" charset="0"/>
+                  </a:rPr>
+                  <a:t>Synchronous call</a:t>
+                </a:r>
+              </a:p>
+            </p:txBody>
+          </p:sp>
+        </p:grpSp>
+        <p:cxnSp>
+          <p:nvCxnSpPr>
+            <p:cNvPr id="9" name="曲線コネクタ 8">
               <a:extLst>
                 <a:ext uri="{FF2B5EF4-FFF2-40B4-BE49-F238E27FC236}">
-                  <a16:creationId xmlns:a16="http://schemas.microsoft.com/office/drawing/2014/main" id="{C1AAB99E-CC42-CF4B-BF27-47F0EF926F20}"/>
-                </a:ext>
-              </a:extLst>
-            </p:cNvPr>
-            <p:cNvSpPr/>
-            <p:nvPr/>
-          </p:nvSpPr>
-          <p:spPr>
-            <a:xfrm>
-              <a:off x="2117035" y="2643809"/>
-              <a:ext cx="2276061" cy="2097156"/>
-            </a:xfrm>
-            <a:prstGeom prst="roundRect">
-              <a:avLst/>
-            </a:prstGeom>
-          </p:spPr>
-          <p:style>
-            <a:lnRef idx="1">
-              <a:schemeClr val="accent1"/>
-            </a:lnRef>
-            <a:fillRef idx="2">
-              <a:schemeClr val="accent1"/>
-            </a:fillRef>
-            <a:effectRef idx="1">
-              <a:schemeClr val="accent1"/>
-            </a:effectRef>
-            <a:fontRef idx="minor">
-              <a:schemeClr val="dk1"/>
-            </a:fontRef>
-          </p:style>
-          <p:txBody>
-            <a:bodyPr rtlCol="0" anchor="ctr"/>
-            <a:lstStyle/>
-            <a:p>
-              <a:pPr algn="ctr"/>
-              <a:r>
-                <a:rPr lang="en-US" dirty="0">
-                  <a:latin typeface="Chalkboard SE" panose="03050602040202020205" pitchFamily="66" charset="0"/>
-                </a:rPr>
-                <a:t>Client</a:t>
-              </a:r>
-              <a:r>
-                <a:rPr lang="ja-JP" altLang="en-US">
-                  <a:latin typeface="Chalkboard SE" panose="03050602040202020205" pitchFamily="66" charset="0"/>
-                </a:rPr>
-                <a:t> </a:t>
-              </a:r>
-              <a:r>
-                <a:rPr lang="en-US" altLang="ja-JP" dirty="0">
-                  <a:latin typeface="Chalkboard SE" panose="03050602040202020205" pitchFamily="66" charset="0"/>
-                </a:rPr>
-                <a:t>code</a:t>
-              </a:r>
-              <a:br>
-                <a:rPr lang="en-US" dirty="0">
-                  <a:latin typeface="Chalkboard SE" panose="03050602040202020205" pitchFamily="66" charset="0"/>
-                </a:rPr>
-              </a:br>
-              <a:r>
-                <a:rPr lang="en-US" dirty="0">
-                  <a:latin typeface="Chalkboard SE" panose="03050602040202020205" pitchFamily="66" charset="0"/>
-                </a:rPr>
-                <a:t>(EPS program)</a:t>
-              </a:r>
-            </a:p>
-          </p:txBody>
-        </p:sp>
-        <p:sp>
-          <p:nvSpPr>
-            <p:cNvPr id="5" name="角丸四角形 4">
-              <a:extLst>
-                <a:ext uri="{FF2B5EF4-FFF2-40B4-BE49-F238E27FC236}">
-                  <a16:creationId xmlns:a16="http://schemas.microsoft.com/office/drawing/2014/main" id="{04E79DE5-79F0-0A40-AE76-F828E7183D83}"/>
-                </a:ext>
-              </a:extLst>
-            </p:cNvPr>
-            <p:cNvSpPr/>
-            <p:nvPr/>
-          </p:nvSpPr>
-          <p:spPr>
-            <a:xfrm>
-              <a:off x="5539685" y="2643809"/>
-              <a:ext cx="2276061" cy="2097156"/>
-            </a:xfrm>
-            <a:prstGeom prst="roundRect">
-              <a:avLst/>
-            </a:prstGeom>
-          </p:spPr>
-          <p:style>
-            <a:lnRef idx="1">
-              <a:schemeClr val="accent6"/>
-            </a:lnRef>
-            <a:fillRef idx="2">
-              <a:schemeClr val="accent6"/>
-            </a:fillRef>
-            <a:effectRef idx="1">
-              <a:schemeClr val="accent6"/>
-            </a:effectRef>
-            <a:fontRef idx="minor">
-              <a:schemeClr val="dk1"/>
-            </a:fontRef>
-          </p:style>
-          <p:txBody>
-            <a:bodyPr rtlCol="0" anchor="ctr"/>
-            <a:lstStyle/>
-            <a:p>
-              <a:pPr algn="ctr"/>
-              <a:r>
-                <a:rPr lang="en-US" dirty="0">
-                  <a:latin typeface="Chalkboard SE" panose="03050602040202020205" pitchFamily="66" charset="0"/>
-                </a:rPr>
-                <a:t>Contract</a:t>
-              </a:r>
-              <a:br>
-                <a:rPr lang="en-US" dirty="0">
-                  <a:latin typeface="Chalkboard SE" panose="03050602040202020205" pitchFamily="66" charset="0"/>
-                </a:rPr>
-              </a:br>
-              <a:r>
-                <a:rPr lang="en-US" dirty="0">
-                  <a:latin typeface="Chalkboard SE" panose="03050602040202020205" pitchFamily="66" charset="0"/>
-                </a:rPr>
-                <a:t>(a Class with methods)</a:t>
-              </a:r>
-            </a:p>
-          </p:txBody>
-        </p:sp>
-        <p:cxnSp>
-          <p:nvCxnSpPr>
-            <p:cNvPr id="7" name="曲線コネクタ 6">
-              <a:extLst>
-                <a:ext uri="{FF2B5EF4-FFF2-40B4-BE49-F238E27FC236}">
-                  <a16:creationId xmlns:a16="http://schemas.microsoft.com/office/drawing/2014/main" id="{D44573E3-0EC8-854C-84A3-0EE19310FD0C}"/>
+                  <a16:creationId xmlns:a16="http://schemas.microsoft.com/office/drawing/2014/main" id="{2DF0A45E-AB45-5C49-9FAA-5C796A26FC15}"/>
                 </a:ext>
               </a:extLst>
             </p:cNvPr>
             <p:cNvCxnSpPr>
               <a:cxnSpLocks/>
-              <a:stCxn id="4" idx="0"/>
-              <a:endCxn id="5" idx="0"/>
+              <a:stCxn id="4" idx="1"/>
+              <a:endCxn id="4" idx="0"/>
             </p:cNvCxnSpPr>
             <p:nvPr/>
           </p:nvCxnSpPr>
           <p:spPr>
-            <a:xfrm rot="5400000" flipH="1" flipV="1">
-              <a:off x="4966391" y="932484"/>
-              <a:ext cx="12700" cy="3422650"/>
+            <a:xfrm rot="10800000" flipH="1">
+              <a:off x="2117034" y="2643809"/>
+              <a:ext cx="1138031" cy="1048578"/>
             </a:xfrm>
-            <a:prstGeom prst="curvedConnector3">
+            <a:prstGeom prst="curvedConnector4">
               <a:avLst>
-                <a:gd name="adj1" fmla="val 1800000"/>
+                <a:gd name="adj1" fmla="val -20087"/>
+                <a:gd name="adj2" fmla="val 121801"/>
               </a:avLst>
             </a:prstGeom>
             <a:ln w="57150">
@@ -4347,10 +4461,10 @@
         </p:cxnSp>
         <p:sp>
           <p:nvSpPr>
-            <p:cNvPr id="15" name="テキスト ボックス 14">
+            <p:cNvPr id="13" name="テキスト ボックス 12">
               <a:extLst>
                 <a:ext uri="{FF2B5EF4-FFF2-40B4-BE49-F238E27FC236}">
-                  <a16:creationId xmlns:a16="http://schemas.microsoft.com/office/drawing/2014/main" id="{CA8BDA25-FBDF-A44F-A800-31CE06B407F7}"/>
+                  <a16:creationId xmlns:a16="http://schemas.microsoft.com/office/drawing/2014/main" id="{D782548A-321B-1746-A73B-FFBE59171969}"/>
                 </a:ext>
               </a:extLst>
             </p:cNvPr>
@@ -4359,8 +4473,8 @@
           </p:nvSpPr>
           <p:spPr>
             <a:xfrm>
-              <a:off x="3975512" y="2009133"/>
-              <a:ext cx="1994457" cy="369332"/>
+              <a:off x="653939" y="1685967"/>
+              <a:ext cx="2926187" cy="646331"/>
             </a:xfrm>
             <a:prstGeom prst="rect">
               <a:avLst/>
@@ -4378,7 +4492,483 @@
                 <a:rPr lang="en-US" dirty="0">
                   <a:latin typeface="Chalkboard SE" panose="03050602040202020205" pitchFamily="66" charset="0"/>
                 </a:rPr>
-                <a:t>Synchronous call</a:t>
+                <a:t>Internal event passing</a:t>
+              </a:r>
+              <a:br>
+                <a:rPr lang="en-US" dirty="0">
+                  <a:latin typeface="Chalkboard SE" panose="03050602040202020205" pitchFamily="66" charset="0"/>
+                </a:rPr>
+              </a:br>
+              <a:r>
+                <a:rPr lang="en-US" dirty="0">
+                  <a:latin typeface="Chalkboard SE" panose="03050602040202020205" pitchFamily="66" charset="0"/>
+                </a:rPr>
+                <a:t>depends on the call result</a:t>
+              </a:r>
+            </a:p>
+          </p:txBody>
+        </p:sp>
+      </p:grpSp>
+    </p:spTree>
+    <p:extLst>
+      <p:ext uri="{BB962C8B-B14F-4D97-AF65-F5344CB8AC3E}">
+        <p14:creationId xmlns:p14="http://schemas.microsoft.com/office/powerpoint/2010/main" val="639619802"/>
+      </p:ext>
+    </p:extLst>
+  </p:cSld>
+  <p:clrMapOvr>
+    <a:masterClrMapping/>
+  </p:clrMapOvr>
+</p:sld>
+</file>
+
+<file path=ppt/slides/slide4.xml><?xml version="1.0" encoding="utf-8"?>
+<p:sld xmlns:a="http://schemas.openxmlformats.org/drawingml/2006/main" xmlns:r="http://schemas.openxmlformats.org/officeDocument/2006/relationships" xmlns:p="http://schemas.openxmlformats.org/presentationml/2006/main">
+  <p:cSld>
+    <p:spTree>
+      <p:nvGrpSpPr>
+        <p:cNvPr id="1" name=""/>
+        <p:cNvGrpSpPr/>
+        <p:nvPr/>
+      </p:nvGrpSpPr>
+      <p:grpSpPr>
+        <a:xfrm>
+          <a:off x="0" y="0"/>
+          <a:ext cx="0" cy="0"/>
+          <a:chOff x="0" y="0"/>
+          <a:chExt cx="0" cy="0"/>
+        </a:xfrm>
+      </p:grpSpPr>
+      <p:sp>
+        <p:nvSpPr>
+          <p:cNvPr id="2" name="タイトル 1">
+            <a:extLst>
+              <a:ext uri="{FF2B5EF4-FFF2-40B4-BE49-F238E27FC236}">
+                <a16:creationId xmlns:a16="http://schemas.microsoft.com/office/drawing/2014/main" id="{A1A6A05A-A837-224F-9CAC-113D471B099D}"/>
+              </a:ext>
+            </a:extLst>
+          </p:cNvPr>
+          <p:cNvSpPr>
+            <a:spLocks noGrp="1"/>
+          </p:cNvSpPr>
+          <p:nvPr>
+            <p:ph type="title"/>
+          </p:nvPr>
+        </p:nvSpPr>
+        <p:spPr/>
+        <p:txBody>
+          <a:bodyPr/>
+          <a:lstStyle/>
+          <a:p>
+            <a:r>
+              <a:rPr lang="en-US" dirty="0"/>
+              <a:t>Both EPS-Converted: htlc3.js</a:t>
+            </a:r>
+          </a:p>
+        </p:txBody>
+      </p:sp>
+      <p:grpSp>
+        <p:nvGrpSpPr>
+          <p:cNvPr id="10" name="グループ化 9">
+            <a:extLst>
+              <a:ext uri="{FF2B5EF4-FFF2-40B4-BE49-F238E27FC236}">
+                <a16:creationId xmlns:a16="http://schemas.microsoft.com/office/drawing/2014/main" id="{37D21BA7-D0F3-1748-9EA3-A26E02F124A2}"/>
+              </a:ext>
+            </a:extLst>
+          </p:cNvPr>
+          <p:cNvGrpSpPr/>
+          <p:nvPr/>
+        </p:nvGrpSpPr>
+        <p:grpSpPr>
+          <a:xfrm>
+            <a:off x="653939" y="1685967"/>
+            <a:ext cx="9762807" cy="3389913"/>
+            <a:chOff x="653939" y="1685967"/>
+            <a:chExt cx="9762807" cy="3389913"/>
+          </a:xfrm>
+        </p:grpSpPr>
+        <p:grpSp>
+          <p:nvGrpSpPr>
+            <p:cNvPr id="21" name="グループ化 20">
+              <a:extLst>
+                <a:ext uri="{FF2B5EF4-FFF2-40B4-BE49-F238E27FC236}">
+                  <a16:creationId xmlns:a16="http://schemas.microsoft.com/office/drawing/2014/main" id="{369AF915-527D-884D-BD0F-B7B99F0441C9}"/>
+                </a:ext>
+              </a:extLst>
+            </p:cNvPr>
+            <p:cNvGrpSpPr/>
+            <p:nvPr/>
+          </p:nvGrpSpPr>
+          <p:grpSpPr>
+            <a:xfrm>
+              <a:off x="2117035" y="1864391"/>
+              <a:ext cx="8299711" cy="3211489"/>
+              <a:chOff x="2117035" y="1864391"/>
+              <a:chExt cx="8299711" cy="3211489"/>
+            </a:xfrm>
+          </p:grpSpPr>
+          <p:sp>
+            <p:nvSpPr>
+              <p:cNvPr id="20" name="角丸四角形 19">
+                <a:extLst>
+                  <a:ext uri="{FF2B5EF4-FFF2-40B4-BE49-F238E27FC236}">
+                    <a16:creationId xmlns:a16="http://schemas.microsoft.com/office/drawing/2014/main" id="{6597BD77-2268-1142-B9FE-D9F886958A64}"/>
+                  </a:ext>
+                </a:extLst>
+              </p:cNvPr>
+              <p:cNvSpPr/>
+              <p:nvPr/>
+            </p:nvSpPr>
+            <p:spPr>
+              <a:xfrm>
+                <a:off x="5197814" y="1864391"/>
+                <a:ext cx="5218932" cy="3211489"/>
+              </a:xfrm>
+              <a:prstGeom prst="roundRect">
+                <a:avLst/>
+              </a:prstGeom>
+            </p:spPr>
+            <p:style>
+              <a:lnRef idx="1">
+                <a:schemeClr val="accent2"/>
+              </a:lnRef>
+              <a:fillRef idx="2">
+                <a:schemeClr val="accent2"/>
+              </a:fillRef>
+              <a:effectRef idx="1">
+                <a:schemeClr val="accent2"/>
+              </a:effectRef>
+              <a:fontRef idx="minor">
+                <a:schemeClr val="dk1"/>
+              </a:fontRef>
+            </p:style>
+            <p:txBody>
+              <a:bodyPr rtlCol="0" anchor="t"/>
+              <a:lstStyle/>
+              <a:p>
+                <a:pPr algn="ctr"/>
+                <a:r>
+                  <a:rPr lang="en-US" dirty="0">
+                    <a:latin typeface="Chalkboard SE" panose="03050602040202020205" pitchFamily="66" charset="0"/>
+                  </a:rPr>
+                  <a:t>Ledger</a:t>
+                </a:r>
+              </a:p>
+            </p:txBody>
+          </p:sp>
+          <p:sp>
+            <p:nvSpPr>
+              <p:cNvPr id="4" name="角丸四角形 3">
+                <a:extLst>
+                  <a:ext uri="{FF2B5EF4-FFF2-40B4-BE49-F238E27FC236}">
+                    <a16:creationId xmlns:a16="http://schemas.microsoft.com/office/drawing/2014/main" id="{C1AAB99E-CC42-CF4B-BF27-47F0EF926F20}"/>
+                  </a:ext>
+                </a:extLst>
+              </p:cNvPr>
+              <p:cNvSpPr/>
+              <p:nvPr/>
+            </p:nvSpPr>
+            <p:spPr>
+              <a:xfrm>
+                <a:off x="2117035" y="2643809"/>
+                <a:ext cx="2276061" cy="2097156"/>
+              </a:xfrm>
+              <a:prstGeom prst="roundRect">
+                <a:avLst/>
+              </a:prstGeom>
+            </p:spPr>
+            <p:style>
+              <a:lnRef idx="1">
+                <a:schemeClr val="accent1"/>
+              </a:lnRef>
+              <a:fillRef idx="2">
+                <a:schemeClr val="accent1"/>
+              </a:fillRef>
+              <a:effectRef idx="1">
+                <a:schemeClr val="accent1"/>
+              </a:effectRef>
+              <a:fontRef idx="minor">
+                <a:schemeClr val="dk1"/>
+              </a:fontRef>
+            </p:style>
+            <p:txBody>
+              <a:bodyPr rtlCol="0" anchor="ctr"/>
+              <a:lstStyle/>
+              <a:p>
+                <a:pPr algn="ctr"/>
+                <a:r>
+                  <a:rPr lang="en-US" dirty="0">
+                    <a:latin typeface="Chalkboard SE" panose="03050602040202020205" pitchFamily="66" charset="0"/>
+                  </a:rPr>
+                  <a:t>Client</a:t>
+                </a:r>
+                <a:r>
+                  <a:rPr lang="ja-JP" altLang="en-US">
+                    <a:latin typeface="Chalkboard SE" panose="03050602040202020205" pitchFamily="66" charset="0"/>
+                  </a:rPr>
+                  <a:t> </a:t>
+                </a:r>
+                <a:r>
+                  <a:rPr lang="en-US" altLang="ja-JP" dirty="0">
+                    <a:latin typeface="Chalkboard SE" panose="03050602040202020205" pitchFamily="66" charset="0"/>
+                  </a:rPr>
+                  <a:t>code</a:t>
+                </a:r>
+                <a:br>
+                  <a:rPr lang="en-US" dirty="0">
+                    <a:latin typeface="Chalkboard SE" panose="03050602040202020205" pitchFamily="66" charset="0"/>
+                  </a:rPr>
+                </a:br>
+                <a:r>
+                  <a:rPr lang="en-US" dirty="0">
+                    <a:latin typeface="Chalkboard SE" panose="03050602040202020205" pitchFamily="66" charset="0"/>
+                  </a:rPr>
+                  <a:t>(EPS program)</a:t>
+                </a:r>
+              </a:p>
+            </p:txBody>
+          </p:sp>
+          <p:sp>
+            <p:nvSpPr>
+              <p:cNvPr id="5" name="角丸四角形 4">
+                <a:extLst>
+                  <a:ext uri="{FF2B5EF4-FFF2-40B4-BE49-F238E27FC236}">
+                    <a16:creationId xmlns:a16="http://schemas.microsoft.com/office/drawing/2014/main" id="{04E79DE5-79F0-0A40-AE76-F828E7183D83}"/>
+                  </a:ext>
+                </a:extLst>
+              </p:cNvPr>
+              <p:cNvSpPr/>
+              <p:nvPr/>
+            </p:nvSpPr>
+            <p:spPr>
+              <a:xfrm>
+                <a:off x="5539685" y="2643809"/>
+                <a:ext cx="2276061" cy="2097156"/>
+              </a:xfrm>
+              <a:prstGeom prst="roundRect">
+                <a:avLst/>
+              </a:prstGeom>
+            </p:spPr>
+            <p:style>
+              <a:lnRef idx="1">
+                <a:schemeClr val="accent6"/>
+              </a:lnRef>
+              <a:fillRef idx="2">
+                <a:schemeClr val="accent6"/>
+              </a:fillRef>
+              <a:effectRef idx="1">
+                <a:schemeClr val="accent6"/>
+              </a:effectRef>
+              <a:fontRef idx="minor">
+                <a:schemeClr val="dk1"/>
+              </a:fontRef>
+            </p:style>
+            <p:txBody>
+              <a:bodyPr rtlCol="0" anchor="ctr"/>
+              <a:lstStyle/>
+              <a:p>
+                <a:pPr algn="ctr"/>
+                <a:r>
+                  <a:rPr lang="en-US" dirty="0">
+                    <a:latin typeface="Chalkboard SE" panose="03050602040202020205" pitchFamily="66" charset="0"/>
+                  </a:rPr>
+                  <a:t>Contract</a:t>
+                </a:r>
+                <a:br>
+                  <a:rPr lang="en-US" dirty="0">
+                    <a:latin typeface="Chalkboard SE" panose="03050602040202020205" pitchFamily="66" charset="0"/>
+                  </a:rPr>
+                </a:br>
+                <a:r>
+                  <a:rPr lang="en-US" dirty="0">
+                    <a:latin typeface="Chalkboard SE" panose="03050602040202020205" pitchFamily="66" charset="0"/>
+                  </a:rPr>
+                  <a:t>(a Class with methods)</a:t>
+                </a:r>
+              </a:p>
+            </p:txBody>
+          </p:sp>
+          <p:cxnSp>
+            <p:nvCxnSpPr>
+              <p:cNvPr id="7" name="曲線コネクタ 6">
+                <a:extLst>
+                  <a:ext uri="{FF2B5EF4-FFF2-40B4-BE49-F238E27FC236}">
+                    <a16:creationId xmlns:a16="http://schemas.microsoft.com/office/drawing/2014/main" id="{D44573E3-0EC8-854C-84A3-0EE19310FD0C}"/>
+                  </a:ext>
+                </a:extLst>
+              </p:cNvPr>
+              <p:cNvCxnSpPr>
+                <a:cxnSpLocks/>
+                <a:stCxn id="4" idx="0"/>
+                <a:endCxn id="5" idx="0"/>
+              </p:cNvCxnSpPr>
+              <p:nvPr/>
+            </p:nvCxnSpPr>
+            <p:spPr>
+              <a:xfrm rot="5400000" flipH="1" flipV="1">
+                <a:off x="4966391" y="932484"/>
+                <a:ext cx="12700" cy="3422650"/>
+              </a:xfrm>
+              <a:prstGeom prst="curvedConnector3">
+                <a:avLst>
+                  <a:gd name="adj1" fmla="val 1800000"/>
+                </a:avLst>
+              </a:prstGeom>
+              <a:ln w="57150">
+                <a:solidFill>
+                  <a:schemeClr val="tx2"/>
+                </a:solidFill>
+                <a:tailEnd type="triangle"/>
+              </a:ln>
+            </p:spPr>
+            <p:style>
+              <a:lnRef idx="1">
+                <a:schemeClr val="accent1"/>
+              </a:lnRef>
+              <a:fillRef idx="0">
+                <a:schemeClr val="accent1"/>
+              </a:fillRef>
+              <a:effectRef idx="0">
+                <a:schemeClr val="accent1"/>
+              </a:effectRef>
+              <a:fontRef idx="minor">
+                <a:schemeClr val="tx1"/>
+              </a:fontRef>
+            </p:style>
+          </p:cxnSp>
+          <p:sp>
+            <p:nvSpPr>
+              <p:cNvPr id="15" name="テキスト ボックス 14">
+                <a:extLst>
+                  <a:ext uri="{FF2B5EF4-FFF2-40B4-BE49-F238E27FC236}">
+                    <a16:creationId xmlns:a16="http://schemas.microsoft.com/office/drawing/2014/main" id="{CA8BDA25-FBDF-A44F-A800-31CE06B407F7}"/>
+                  </a:ext>
+                </a:extLst>
+              </p:cNvPr>
+              <p:cNvSpPr txBox="1"/>
+              <p:nvPr/>
+            </p:nvSpPr>
+            <p:spPr>
+              <a:xfrm>
+                <a:off x="3975512" y="2009133"/>
+                <a:ext cx="1994457" cy="369332"/>
+              </a:xfrm>
+              <a:prstGeom prst="rect">
+                <a:avLst/>
+              </a:prstGeom>
+              <a:noFill/>
+            </p:spPr>
+            <p:txBody>
+              <a:bodyPr wrap="none" rtlCol="0">
+                <a:spAutoFit/>
+              </a:bodyPr>
+              <a:lstStyle/>
+              <a:p>
+                <a:pPr algn="ctr"/>
+                <a:r>
+                  <a:rPr lang="en-US" dirty="0">
+                    <a:latin typeface="Chalkboard SE" panose="03050602040202020205" pitchFamily="66" charset="0"/>
+                  </a:rPr>
+                  <a:t>Synchronous call</a:t>
+                </a:r>
+              </a:p>
+            </p:txBody>
+          </p:sp>
+        </p:grpSp>
+        <p:cxnSp>
+          <p:nvCxnSpPr>
+            <p:cNvPr id="9" name="曲線コネクタ 8">
+              <a:extLst>
+                <a:ext uri="{FF2B5EF4-FFF2-40B4-BE49-F238E27FC236}">
+                  <a16:creationId xmlns:a16="http://schemas.microsoft.com/office/drawing/2014/main" id="{2DF0A45E-AB45-5C49-9FAA-5C796A26FC15}"/>
+                </a:ext>
+              </a:extLst>
+            </p:cNvPr>
+            <p:cNvCxnSpPr>
+              <a:cxnSpLocks/>
+              <a:stCxn id="4" idx="1"/>
+              <a:endCxn id="4" idx="0"/>
+            </p:cNvCxnSpPr>
+            <p:nvPr/>
+          </p:nvCxnSpPr>
+          <p:spPr>
+            <a:xfrm rot="10800000" flipH="1">
+              <a:off x="2117034" y="2643809"/>
+              <a:ext cx="1138031" cy="1048578"/>
+            </a:xfrm>
+            <a:prstGeom prst="curvedConnector4">
+              <a:avLst>
+                <a:gd name="adj1" fmla="val -20087"/>
+                <a:gd name="adj2" fmla="val 121801"/>
+              </a:avLst>
+            </a:prstGeom>
+            <a:ln w="57150">
+              <a:solidFill>
+                <a:schemeClr val="tx2"/>
+              </a:solidFill>
+              <a:tailEnd type="triangle"/>
+            </a:ln>
+          </p:spPr>
+          <p:style>
+            <a:lnRef idx="1">
+              <a:schemeClr val="accent1"/>
+            </a:lnRef>
+            <a:fillRef idx="0">
+              <a:schemeClr val="accent1"/>
+            </a:fillRef>
+            <a:effectRef idx="0">
+              <a:schemeClr val="accent1"/>
+            </a:effectRef>
+            <a:fontRef idx="minor">
+              <a:schemeClr val="tx1"/>
+            </a:fontRef>
+          </p:style>
+        </p:cxnSp>
+        <p:sp>
+          <p:nvSpPr>
+            <p:cNvPr id="13" name="テキスト ボックス 12">
+              <a:extLst>
+                <a:ext uri="{FF2B5EF4-FFF2-40B4-BE49-F238E27FC236}">
+                  <a16:creationId xmlns:a16="http://schemas.microsoft.com/office/drawing/2014/main" id="{D782548A-321B-1746-A73B-FFBE59171969}"/>
+                </a:ext>
+              </a:extLst>
+            </p:cNvPr>
+            <p:cNvSpPr txBox="1"/>
+            <p:nvPr/>
+          </p:nvSpPr>
+          <p:spPr>
+            <a:xfrm>
+              <a:off x="653939" y="1685967"/>
+              <a:ext cx="2926187" cy="646331"/>
+            </a:xfrm>
+            <a:prstGeom prst="rect">
+              <a:avLst/>
+            </a:prstGeom>
+            <a:noFill/>
+          </p:spPr>
+          <p:txBody>
+            <a:bodyPr wrap="none" rtlCol="0">
+              <a:spAutoFit/>
+            </a:bodyPr>
+            <a:lstStyle/>
+            <a:p>
+              <a:pPr algn="ctr"/>
+              <a:r>
+                <a:rPr lang="en-US" dirty="0">
+                  <a:latin typeface="Chalkboard SE" panose="03050602040202020205" pitchFamily="66" charset="0"/>
+                </a:rPr>
+                <a:t>Internal event passing</a:t>
+              </a:r>
+              <a:br>
+                <a:rPr lang="en-US" dirty="0">
+                  <a:latin typeface="Chalkboard SE" panose="03050602040202020205" pitchFamily="66" charset="0"/>
+                </a:rPr>
+              </a:br>
+              <a:r>
+                <a:rPr lang="en-US" dirty="0">
+                  <a:latin typeface="Chalkboard SE" panose="03050602040202020205" pitchFamily="66" charset="0"/>
+                </a:rPr>
+                <a:t>depends on the call result</a:t>
               </a:r>
             </a:p>
           </p:txBody>
@@ -4386,29 +4976,28 @@
       </p:grpSp>
       <p:cxnSp>
         <p:nvCxnSpPr>
-          <p:cNvPr id="9" name="曲線コネクタ 8">
-            <a:extLst>
-              <a:ext uri="{FF2B5EF4-FFF2-40B4-BE49-F238E27FC236}">
-                <a16:creationId xmlns:a16="http://schemas.microsoft.com/office/drawing/2014/main" id="{2DF0A45E-AB45-5C49-9FAA-5C796A26FC15}"/>
+          <p:cNvPr id="12" name="曲線コネクタ 11">
+            <a:extLst>
+              <a:ext uri="{FF2B5EF4-FFF2-40B4-BE49-F238E27FC236}">
+                <a16:creationId xmlns:a16="http://schemas.microsoft.com/office/drawing/2014/main" id="{33DA5504-1BCF-7E4E-AB9A-C5FD26EF44EF}"/>
               </a:ext>
             </a:extLst>
           </p:cNvPr>
           <p:cNvCxnSpPr>
             <a:cxnSpLocks/>
-            <a:stCxn id="4" idx="1"/>
-            <a:endCxn id="4" idx="0"/>
+            <a:stCxn id="5" idx="2"/>
           </p:cNvCxnSpPr>
           <p:nvPr/>
         </p:nvCxnSpPr>
         <p:spPr>
-          <a:xfrm rot="10800000" flipH="1">
-            <a:off x="2117034" y="2643809"/>
-            <a:ext cx="1138031" cy="1048578"/>
+          <a:xfrm rot="5400000" flipH="1" flipV="1">
+            <a:off x="6722442" y="3647662"/>
+            <a:ext cx="1048577" cy="1138030"/>
           </a:xfrm>
           <a:prstGeom prst="curvedConnector4">
             <a:avLst>
-              <a:gd name="adj1" fmla="val -20087"/>
-              <a:gd name="adj2" fmla="val 121801"/>
+              <a:gd name="adj1" fmla="val -21801"/>
+              <a:gd name="adj2" fmla="val 142677"/>
             </a:avLst>
           </a:prstGeom>
           <a:ln w="57150">
@@ -4435,10 +5024,10 @@
       </p:cxnSp>
       <p:sp>
         <p:nvSpPr>
-          <p:cNvPr id="13" name="テキスト ボックス 12">
-            <a:extLst>
-              <a:ext uri="{FF2B5EF4-FFF2-40B4-BE49-F238E27FC236}">
-                <a16:creationId xmlns:a16="http://schemas.microsoft.com/office/drawing/2014/main" id="{D782548A-321B-1746-A73B-FFBE59171969}"/>
+          <p:cNvPr id="18" name="テキスト ボックス 17">
+            <a:extLst>
+              <a:ext uri="{FF2B5EF4-FFF2-40B4-BE49-F238E27FC236}">
+                <a16:creationId xmlns:a16="http://schemas.microsoft.com/office/drawing/2014/main" id="{A65E2354-7501-CB49-A8BA-1FEB59C7B1E8}"/>
               </a:ext>
             </a:extLst>
           </p:cNvPr>
@@ -4447,8 +5036,8 @@
         </p:nvSpPr>
         <p:spPr>
           <a:xfrm>
-            <a:off x="653939" y="1685967"/>
-            <a:ext cx="2926187" cy="646331"/>
+            <a:off x="8442823" y="3570346"/>
+            <a:ext cx="2631105" cy="646331"/>
           </a:xfrm>
           <a:prstGeom prst="rect">
             <a:avLst/>
@@ -4466,7 +5055,7 @@
               <a:rPr lang="en-US" dirty="0">
                 <a:latin typeface="Chalkboard SE" panose="03050602040202020205" pitchFamily="66" charset="0"/>
               </a:rPr>
-              <a:t>Internal event passing</a:t>
+              <a:t>Modifier converted into</a:t>
             </a:r>
             <a:br>
               <a:rPr lang="en-US" dirty="0">
@@ -4477,7 +5066,7 @@
               <a:rPr lang="en-US" dirty="0">
                 <a:latin typeface="Chalkboard SE" panose="03050602040202020205" pitchFamily="66" charset="0"/>
               </a:rPr>
-              <a:t>depends on the call result</a:t>
+              <a:t>internal event passing</a:t>
             </a:r>
           </a:p>
         </p:txBody>
@@ -4485,7 +5074,7 @@
     </p:spTree>
     <p:extLst>
       <p:ext uri="{BB962C8B-B14F-4D97-AF65-F5344CB8AC3E}">
-        <p14:creationId xmlns:p14="http://schemas.microsoft.com/office/powerpoint/2010/main" val="639619802"/>
+        <p14:creationId xmlns:p14="http://schemas.microsoft.com/office/powerpoint/2010/main" val="1293634083"/>
       </p:ext>
     </p:extLst>
   </p:cSld>

</xml_diff>

<commit_message>
add new statemachine module
</commit_message>
<xml_diff>
--- a/docs/figures.pptx
+++ b/docs/figures.pptx
@@ -4569,10 +4569,10 @@
       </p:sp>
       <p:grpSp>
         <p:nvGrpSpPr>
-          <p:cNvPr id="10" name="グループ化 9">
-            <a:extLst>
-              <a:ext uri="{FF2B5EF4-FFF2-40B4-BE49-F238E27FC236}">
-                <a16:creationId xmlns:a16="http://schemas.microsoft.com/office/drawing/2014/main" id="{37D21BA7-D0F3-1748-9EA3-A26E02F124A2}"/>
+          <p:cNvPr id="16" name="グループ化 15">
+            <a:extLst>
+              <a:ext uri="{FF2B5EF4-FFF2-40B4-BE49-F238E27FC236}">
+                <a16:creationId xmlns:a16="http://schemas.microsoft.com/office/drawing/2014/main" id="{D5CDD827-EEAB-D54E-982F-74C43293624C}"/>
               </a:ext>
             </a:extLst>
           </p:cNvPr>
@@ -4582,17 +4582,17 @@
         <p:grpSpPr>
           <a:xfrm>
             <a:off x="653939" y="1685967"/>
-            <a:ext cx="9762807" cy="3389913"/>
+            <a:ext cx="10419989" cy="3389913"/>
             <a:chOff x="653939" y="1685967"/>
-            <a:chExt cx="9762807" cy="3389913"/>
+            <a:chExt cx="10419989" cy="3389913"/>
           </a:xfrm>
         </p:grpSpPr>
         <p:grpSp>
           <p:nvGrpSpPr>
-            <p:cNvPr id="21" name="グループ化 20">
+            <p:cNvPr id="10" name="グループ化 9">
               <a:extLst>
                 <a:ext uri="{FF2B5EF4-FFF2-40B4-BE49-F238E27FC236}">
-                  <a16:creationId xmlns:a16="http://schemas.microsoft.com/office/drawing/2014/main" id="{369AF915-527D-884D-BD0F-B7B99F0441C9}"/>
+                  <a16:creationId xmlns:a16="http://schemas.microsoft.com/office/drawing/2014/main" id="{37D21BA7-D0F3-1748-9EA3-A26E02F124A2}"/>
                 </a:ext>
               </a:extLst>
             </p:cNvPr>
@@ -4601,217 +4601,325 @@
           </p:nvGrpSpPr>
           <p:grpSpPr>
             <a:xfrm>
-              <a:off x="2117035" y="1864391"/>
-              <a:ext cx="8299711" cy="3211489"/>
-              <a:chOff x="2117035" y="1864391"/>
-              <a:chExt cx="8299711" cy="3211489"/>
+              <a:off x="653939" y="1685967"/>
+              <a:ext cx="9762807" cy="3389913"/>
+              <a:chOff x="653939" y="1685967"/>
+              <a:chExt cx="9762807" cy="3389913"/>
             </a:xfrm>
           </p:grpSpPr>
-          <p:sp>
-            <p:nvSpPr>
-              <p:cNvPr id="20" name="角丸四角形 19">
+          <p:grpSp>
+            <p:nvGrpSpPr>
+              <p:cNvPr id="21" name="グループ化 20">
                 <a:extLst>
                   <a:ext uri="{FF2B5EF4-FFF2-40B4-BE49-F238E27FC236}">
-                    <a16:creationId xmlns:a16="http://schemas.microsoft.com/office/drawing/2014/main" id="{6597BD77-2268-1142-B9FE-D9F886958A64}"/>
+                    <a16:creationId xmlns:a16="http://schemas.microsoft.com/office/drawing/2014/main" id="{369AF915-527D-884D-BD0F-B7B99F0441C9}"/>
                   </a:ext>
                 </a:extLst>
               </p:cNvPr>
-              <p:cNvSpPr/>
+              <p:cNvGrpSpPr/>
               <p:nvPr/>
-            </p:nvSpPr>
-            <p:spPr>
+            </p:nvGrpSpPr>
+            <p:grpSpPr>
               <a:xfrm>
-                <a:off x="5197814" y="1864391"/>
-                <a:ext cx="5218932" cy="3211489"/>
+                <a:off x="2117035" y="1864391"/>
+                <a:ext cx="8299711" cy="3211489"/>
+                <a:chOff x="2117035" y="1864391"/>
+                <a:chExt cx="8299711" cy="3211489"/>
               </a:xfrm>
-              <a:prstGeom prst="roundRect">
-                <a:avLst/>
-              </a:prstGeom>
-            </p:spPr>
-            <p:style>
-              <a:lnRef idx="1">
-                <a:schemeClr val="accent2"/>
-              </a:lnRef>
-              <a:fillRef idx="2">
-                <a:schemeClr val="accent2"/>
-              </a:fillRef>
-              <a:effectRef idx="1">
-                <a:schemeClr val="accent2"/>
-              </a:effectRef>
-              <a:fontRef idx="minor">
-                <a:schemeClr val="dk1"/>
-              </a:fontRef>
-            </p:style>
-            <p:txBody>
-              <a:bodyPr rtlCol="0" anchor="t"/>
-              <a:lstStyle/>
-              <a:p>
-                <a:pPr algn="ctr"/>
-                <a:r>
-                  <a:rPr lang="en-US" dirty="0">
-                    <a:latin typeface="Chalkboard SE" panose="03050602040202020205" pitchFamily="66" charset="0"/>
-                  </a:rPr>
-                  <a:t>Ledger</a:t>
-                </a:r>
-              </a:p>
-            </p:txBody>
-          </p:sp>
-          <p:sp>
-            <p:nvSpPr>
-              <p:cNvPr id="4" name="角丸四角形 3">
+            </p:grpSpPr>
+            <p:sp>
+              <p:nvSpPr>
+                <p:cNvPr id="20" name="角丸四角形 19">
+                  <a:extLst>
+                    <a:ext uri="{FF2B5EF4-FFF2-40B4-BE49-F238E27FC236}">
+                      <a16:creationId xmlns:a16="http://schemas.microsoft.com/office/drawing/2014/main" id="{6597BD77-2268-1142-B9FE-D9F886958A64}"/>
+                    </a:ext>
+                  </a:extLst>
+                </p:cNvPr>
+                <p:cNvSpPr/>
+                <p:nvPr/>
+              </p:nvSpPr>
+              <p:spPr>
+                <a:xfrm>
+                  <a:off x="5197814" y="1864391"/>
+                  <a:ext cx="5218932" cy="3211489"/>
+                </a:xfrm>
+                <a:prstGeom prst="roundRect">
+                  <a:avLst/>
+                </a:prstGeom>
+              </p:spPr>
+              <p:style>
+                <a:lnRef idx="1">
+                  <a:schemeClr val="accent2"/>
+                </a:lnRef>
+                <a:fillRef idx="2">
+                  <a:schemeClr val="accent2"/>
+                </a:fillRef>
+                <a:effectRef idx="1">
+                  <a:schemeClr val="accent2"/>
+                </a:effectRef>
+                <a:fontRef idx="minor">
+                  <a:schemeClr val="dk1"/>
+                </a:fontRef>
+              </p:style>
+              <p:txBody>
+                <a:bodyPr rtlCol="0" anchor="t"/>
+                <a:lstStyle/>
+                <a:p>
+                  <a:pPr algn="ctr"/>
+                  <a:r>
+                    <a:rPr lang="en-US" dirty="0">
+                      <a:latin typeface="Chalkboard SE" panose="03050602040202020205" pitchFamily="66" charset="0"/>
+                    </a:rPr>
+                    <a:t>Ledger</a:t>
+                  </a:r>
+                </a:p>
+              </p:txBody>
+            </p:sp>
+            <p:sp>
+              <p:nvSpPr>
+                <p:cNvPr id="4" name="角丸四角形 3">
+                  <a:extLst>
+                    <a:ext uri="{FF2B5EF4-FFF2-40B4-BE49-F238E27FC236}">
+                      <a16:creationId xmlns:a16="http://schemas.microsoft.com/office/drawing/2014/main" id="{C1AAB99E-CC42-CF4B-BF27-47F0EF926F20}"/>
+                    </a:ext>
+                  </a:extLst>
+                </p:cNvPr>
+                <p:cNvSpPr/>
+                <p:nvPr/>
+              </p:nvSpPr>
+              <p:spPr>
+                <a:xfrm>
+                  <a:off x="2117035" y="2643809"/>
+                  <a:ext cx="2276061" cy="2097156"/>
+                </a:xfrm>
+                <a:prstGeom prst="roundRect">
+                  <a:avLst/>
+                </a:prstGeom>
+              </p:spPr>
+              <p:style>
+                <a:lnRef idx="1">
+                  <a:schemeClr val="accent1"/>
+                </a:lnRef>
+                <a:fillRef idx="2">
+                  <a:schemeClr val="accent1"/>
+                </a:fillRef>
+                <a:effectRef idx="1">
+                  <a:schemeClr val="accent1"/>
+                </a:effectRef>
+                <a:fontRef idx="minor">
+                  <a:schemeClr val="dk1"/>
+                </a:fontRef>
+              </p:style>
+              <p:txBody>
+                <a:bodyPr rtlCol="0" anchor="ctr"/>
+                <a:lstStyle/>
+                <a:p>
+                  <a:pPr algn="ctr"/>
+                  <a:r>
+                    <a:rPr lang="en-US" dirty="0">
+                      <a:latin typeface="Chalkboard SE" panose="03050602040202020205" pitchFamily="66" charset="0"/>
+                    </a:rPr>
+                    <a:t>Client</a:t>
+                  </a:r>
+                  <a:r>
+                    <a:rPr lang="ja-JP" altLang="en-US">
+                      <a:latin typeface="Chalkboard SE" panose="03050602040202020205" pitchFamily="66" charset="0"/>
+                    </a:rPr>
+                    <a:t> </a:t>
+                  </a:r>
+                  <a:r>
+                    <a:rPr lang="en-US" altLang="ja-JP" dirty="0">
+                      <a:latin typeface="Chalkboard SE" panose="03050602040202020205" pitchFamily="66" charset="0"/>
+                    </a:rPr>
+                    <a:t>code</a:t>
+                  </a:r>
+                  <a:br>
+                    <a:rPr lang="en-US" dirty="0">
+                      <a:latin typeface="Chalkboard SE" panose="03050602040202020205" pitchFamily="66" charset="0"/>
+                    </a:rPr>
+                  </a:br>
+                  <a:r>
+                    <a:rPr lang="en-US" dirty="0">
+                      <a:latin typeface="Chalkboard SE" panose="03050602040202020205" pitchFamily="66" charset="0"/>
+                    </a:rPr>
+                    <a:t>(EPS program)</a:t>
+                  </a:r>
+                </a:p>
+              </p:txBody>
+            </p:sp>
+            <p:sp>
+              <p:nvSpPr>
+                <p:cNvPr id="5" name="角丸四角形 4">
+                  <a:extLst>
+                    <a:ext uri="{FF2B5EF4-FFF2-40B4-BE49-F238E27FC236}">
+                      <a16:creationId xmlns:a16="http://schemas.microsoft.com/office/drawing/2014/main" id="{04E79DE5-79F0-0A40-AE76-F828E7183D83}"/>
+                    </a:ext>
+                  </a:extLst>
+                </p:cNvPr>
+                <p:cNvSpPr/>
+                <p:nvPr/>
+              </p:nvSpPr>
+              <p:spPr>
+                <a:xfrm>
+                  <a:off x="5539685" y="2643809"/>
+                  <a:ext cx="2276061" cy="2097156"/>
+                </a:xfrm>
+                <a:prstGeom prst="roundRect">
+                  <a:avLst/>
+                </a:prstGeom>
+              </p:spPr>
+              <p:style>
+                <a:lnRef idx="1">
+                  <a:schemeClr val="accent6"/>
+                </a:lnRef>
+                <a:fillRef idx="2">
+                  <a:schemeClr val="accent6"/>
+                </a:fillRef>
+                <a:effectRef idx="1">
+                  <a:schemeClr val="accent6"/>
+                </a:effectRef>
+                <a:fontRef idx="minor">
+                  <a:schemeClr val="dk1"/>
+                </a:fontRef>
+              </p:style>
+              <p:txBody>
+                <a:bodyPr rtlCol="0" anchor="ctr"/>
+                <a:lstStyle/>
+                <a:p>
+                  <a:pPr algn="ctr"/>
+                  <a:r>
+                    <a:rPr lang="en-US" dirty="0">
+                      <a:latin typeface="Chalkboard SE" panose="03050602040202020205" pitchFamily="66" charset="0"/>
+                    </a:rPr>
+                    <a:t>Contract</a:t>
+                  </a:r>
+                  <a:br>
+                    <a:rPr lang="en-US" dirty="0">
+                      <a:latin typeface="Chalkboard SE" panose="03050602040202020205" pitchFamily="66" charset="0"/>
+                    </a:rPr>
+                  </a:br>
+                  <a:r>
+                    <a:rPr lang="en-US" dirty="0">
+                      <a:latin typeface="Chalkboard SE" panose="03050602040202020205" pitchFamily="66" charset="0"/>
+                    </a:rPr>
+                    <a:t>(a Class with methods)</a:t>
+                  </a:r>
+                </a:p>
+              </p:txBody>
+            </p:sp>
+            <p:cxnSp>
+              <p:nvCxnSpPr>
+                <p:cNvPr id="7" name="曲線コネクタ 6">
+                  <a:extLst>
+                    <a:ext uri="{FF2B5EF4-FFF2-40B4-BE49-F238E27FC236}">
+                      <a16:creationId xmlns:a16="http://schemas.microsoft.com/office/drawing/2014/main" id="{D44573E3-0EC8-854C-84A3-0EE19310FD0C}"/>
+                    </a:ext>
+                  </a:extLst>
+                </p:cNvPr>
+                <p:cNvCxnSpPr>
+                  <a:cxnSpLocks/>
+                  <a:stCxn id="4" idx="0"/>
+                  <a:endCxn id="5" idx="0"/>
+                </p:cNvCxnSpPr>
+                <p:nvPr/>
+              </p:nvCxnSpPr>
+              <p:spPr>
+                <a:xfrm rot="5400000" flipH="1" flipV="1">
+                  <a:off x="4966391" y="932484"/>
+                  <a:ext cx="12700" cy="3422650"/>
+                </a:xfrm>
+                <a:prstGeom prst="curvedConnector3">
+                  <a:avLst>
+                    <a:gd name="adj1" fmla="val 1800000"/>
+                  </a:avLst>
+                </a:prstGeom>
+                <a:ln w="57150">
+                  <a:solidFill>
+                    <a:schemeClr val="tx2"/>
+                  </a:solidFill>
+                  <a:tailEnd type="triangle"/>
+                </a:ln>
+              </p:spPr>
+              <p:style>
+                <a:lnRef idx="1">
+                  <a:schemeClr val="accent1"/>
+                </a:lnRef>
+                <a:fillRef idx="0">
+                  <a:schemeClr val="accent1"/>
+                </a:fillRef>
+                <a:effectRef idx="0">
+                  <a:schemeClr val="accent1"/>
+                </a:effectRef>
+                <a:fontRef idx="minor">
+                  <a:schemeClr val="tx1"/>
+                </a:fontRef>
+              </p:style>
+            </p:cxnSp>
+            <p:sp>
+              <p:nvSpPr>
+                <p:cNvPr id="15" name="テキスト ボックス 14">
+                  <a:extLst>
+                    <a:ext uri="{FF2B5EF4-FFF2-40B4-BE49-F238E27FC236}">
+                      <a16:creationId xmlns:a16="http://schemas.microsoft.com/office/drawing/2014/main" id="{CA8BDA25-FBDF-A44F-A800-31CE06B407F7}"/>
+                    </a:ext>
+                  </a:extLst>
+                </p:cNvPr>
+                <p:cNvSpPr txBox="1"/>
+                <p:nvPr/>
+              </p:nvSpPr>
+              <p:spPr>
+                <a:xfrm>
+                  <a:off x="3975512" y="2009133"/>
+                  <a:ext cx="1994457" cy="369332"/>
+                </a:xfrm>
+                <a:prstGeom prst="rect">
+                  <a:avLst/>
+                </a:prstGeom>
+                <a:noFill/>
+              </p:spPr>
+              <p:txBody>
+                <a:bodyPr wrap="none" rtlCol="0">
+                  <a:spAutoFit/>
+                </a:bodyPr>
+                <a:lstStyle/>
+                <a:p>
+                  <a:pPr algn="ctr"/>
+                  <a:r>
+                    <a:rPr lang="en-US" dirty="0">
+                      <a:latin typeface="Chalkboard SE" panose="03050602040202020205" pitchFamily="66" charset="0"/>
+                    </a:rPr>
+                    <a:t>Synchronous call</a:t>
+                  </a:r>
+                </a:p>
+              </p:txBody>
+            </p:sp>
+          </p:grpSp>
+          <p:cxnSp>
+            <p:nvCxnSpPr>
+              <p:cNvPr id="9" name="曲線コネクタ 8">
                 <a:extLst>
                   <a:ext uri="{FF2B5EF4-FFF2-40B4-BE49-F238E27FC236}">
-                    <a16:creationId xmlns:a16="http://schemas.microsoft.com/office/drawing/2014/main" id="{C1AAB99E-CC42-CF4B-BF27-47F0EF926F20}"/>
-                  </a:ext>
-                </a:extLst>
-              </p:cNvPr>
-              <p:cNvSpPr/>
-              <p:nvPr/>
-            </p:nvSpPr>
-            <p:spPr>
-              <a:xfrm>
-                <a:off x="2117035" y="2643809"/>
-                <a:ext cx="2276061" cy="2097156"/>
-              </a:xfrm>
-              <a:prstGeom prst="roundRect">
-                <a:avLst/>
-              </a:prstGeom>
-            </p:spPr>
-            <p:style>
-              <a:lnRef idx="1">
-                <a:schemeClr val="accent1"/>
-              </a:lnRef>
-              <a:fillRef idx="2">
-                <a:schemeClr val="accent1"/>
-              </a:fillRef>
-              <a:effectRef idx="1">
-                <a:schemeClr val="accent1"/>
-              </a:effectRef>
-              <a:fontRef idx="minor">
-                <a:schemeClr val="dk1"/>
-              </a:fontRef>
-            </p:style>
-            <p:txBody>
-              <a:bodyPr rtlCol="0" anchor="ctr"/>
-              <a:lstStyle/>
-              <a:p>
-                <a:pPr algn="ctr"/>
-                <a:r>
-                  <a:rPr lang="en-US" dirty="0">
-                    <a:latin typeface="Chalkboard SE" panose="03050602040202020205" pitchFamily="66" charset="0"/>
-                  </a:rPr>
-                  <a:t>Client</a:t>
-                </a:r>
-                <a:r>
-                  <a:rPr lang="ja-JP" altLang="en-US">
-                    <a:latin typeface="Chalkboard SE" panose="03050602040202020205" pitchFamily="66" charset="0"/>
-                  </a:rPr>
-                  <a:t> </a:t>
-                </a:r>
-                <a:r>
-                  <a:rPr lang="en-US" altLang="ja-JP" dirty="0">
-                    <a:latin typeface="Chalkboard SE" panose="03050602040202020205" pitchFamily="66" charset="0"/>
-                  </a:rPr>
-                  <a:t>code</a:t>
-                </a:r>
-                <a:br>
-                  <a:rPr lang="en-US" dirty="0">
-                    <a:latin typeface="Chalkboard SE" panose="03050602040202020205" pitchFamily="66" charset="0"/>
-                  </a:rPr>
-                </a:br>
-                <a:r>
-                  <a:rPr lang="en-US" dirty="0">
-                    <a:latin typeface="Chalkboard SE" panose="03050602040202020205" pitchFamily="66" charset="0"/>
-                  </a:rPr>
-                  <a:t>(EPS program)</a:t>
-                </a:r>
-              </a:p>
-            </p:txBody>
-          </p:sp>
-          <p:sp>
-            <p:nvSpPr>
-              <p:cNvPr id="5" name="角丸四角形 4">
-                <a:extLst>
-                  <a:ext uri="{FF2B5EF4-FFF2-40B4-BE49-F238E27FC236}">
-                    <a16:creationId xmlns:a16="http://schemas.microsoft.com/office/drawing/2014/main" id="{04E79DE5-79F0-0A40-AE76-F828E7183D83}"/>
-                  </a:ext>
-                </a:extLst>
-              </p:cNvPr>
-              <p:cNvSpPr/>
-              <p:nvPr/>
-            </p:nvSpPr>
-            <p:spPr>
-              <a:xfrm>
-                <a:off x="5539685" y="2643809"/>
-                <a:ext cx="2276061" cy="2097156"/>
-              </a:xfrm>
-              <a:prstGeom prst="roundRect">
-                <a:avLst/>
-              </a:prstGeom>
-            </p:spPr>
-            <p:style>
-              <a:lnRef idx="1">
-                <a:schemeClr val="accent6"/>
-              </a:lnRef>
-              <a:fillRef idx="2">
-                <a:schemeClr val="accent6"/>
-              </a:fillRef>
-              <a:effectRef idx="1">
-                <a:schemeClr val="accent6"/>
-              </a:effectRef>
-              <a:fontRef idx="minor">
-                <a:schemeClr val="dk1"/>
-              </a:fontRef>
-            </p:style>
-            <p:txBody>
-              <a:bodyPr rtlCol="0" anchor="ctr"/>
-              <a:lstStyle/>
-              <a:p>
-                <a:pPr algn="ctr"/>
-                <a:r>
-                  <a:rPr lang="en-US" dirty="0">
-                    <a:latin typeface="Chalkboard SE" panose="03050602040202020205" pitchFamily="66" charset="0"/>
-                  </a:rPr>
-                  <a:t>Contract</a:t>
-                </a:r>
-                <a:br>
-                  <a:rPr lang="en-US" dirty="0">
-                    <a:latin typeface="Chalkboard SE" panose="03050602040202020205" pitchFamily="66" charset="0"/>
-                  </a:rPr>
-                </a:br>
-                <a:r>
-                  <a:rPr lang="en-US" dirty="0">
-                    <a:latin typeface="Chalkboard SE" panose="03050602040202020205" pitchFamily="66" charset="0"/>
-                  </a:rPr>
-                  <a:t>(a Class with methods)</a:t>
-                </a:r>
-              </a:p>
-            </p:txBody>
-          </p:sp>
-          <p:cxnSp>
-            <p:nvCxnSpPr>
-              <p:cNvPr id="7" name="曲線コネクタ 6">
-                <a:extLst>
-                  <a:ext uri="{FF2B5EF4-FFF2-40B4-BE49-F238E27FC236}">
-                    <a16:creationId xmlns:a16="http://schemas.microsoft.com/office/drawing/2014/main" id="{D44573E3-0EC8-854C-84A3-0EE19310FD0C}"/>
+                    <a16:creationId xmlns:a16="http://schemas.microsoft.com/office/drawing/2014/main" id="{2DF0A45E-AB45-5C49-9FAA-5C796A26FC15}"/>
                   </a:ext>
                 </a:extLst>
               </p:cNvPr>
               <p:cNvCxnSpPr>
                 <a:cxnSpLocks/>
-                <a:stCxn id="4" idx="0"/>
-                <a:endCxn id="5" idx="0"/>
+                <a:stCxn id="4" idx="1"/>
+                <a:endCxn id="4" idx="0"/>
               </p:cNvCxnSpPr>
               <p:nvPr/>
             </p:nvCxnSpPr>
             <p:spPr>
-              <a:xfrm rot="5400000" flipH="1" flipV="1">
-                <a:off x="4966391" y="932484"/>
-                <a:ext cx="12700" cy="3422650"/>
+              <a:xfrm rot="10800000" flipH="1">
+                <a:off x="2117034" y="2643809"/>
+                <a:ext cx="1138031" cy="1048578"/>
               </a:xfrm>
-              <a:prstGeom prst="curvedConnector3">
+              <a:prstGeom prst="curvedConnector4">
                 <a:avLst>
-                  <a:gd name="adj1" fmla="val 1800000"/>
+                  <a:gd name="adj1" fmla="val -20087"/>
+                  <a:gd name="adj2" fmla="val 121801"/>
                 </a:avLst>
               </a:prstGeom>
               <a:ln w="57150">
@@ -4838,10 +4946,10 @@
           </p:cxnSp>
           <p:sp>
             <p:nvSpPr>
-              <p:cNvPr id="15" name="テキスト ボックス 14">
+              <p:cNvPr id="13" name="テキスト ボックス 12">
                 <a:extLst>
                   <a:ext uri="{FF2B5EF4-FFF2-40B4-BE49-F238E27FC236}">
-                    <a16:creationId xmlns:a16="http://schemas.microsoft.com/office/drawing/2014/main" id="{CA8BDA25-FBDF-A44F-A800-31CE06B407F7}"/>
+                    <a16:creationId xmlns:a16="http://schemas.microsoft.com/office/drawing/2014/main" id="{D782548A-321B-1746-A73B-FFBE59171969}"/>
                   </a:ext>
                 </a:extLst>
               </p:cNvPr>
@@ -4850,8 +4958,8 @@
             </p:nvSpPr>
             <p:spPr>
               <a:xfrm>
-                <a:off x="3975512" y="2009133"/>
-                <a:ext cx="1994457" cy="369332"/>
+                <a:off x="653939" y="1685967"/>
+                <a:ext cx="2926187" cy="646331"/>
               </a:xfrm>
               <a:prstGeom prst="rect">
                 <a:avLst/>
@@ -4869,7 +4977,18 @@
                   <a:rPr lang="en-US" dirty="0">
                     <a:latin typeface="Chalkboard SE" panose="03050602040202020205" pitchFamily="66" charset="0"/>
                   </a:rPr>
-                  <a:t>Synchronous call</a:t>
+                  <a:t>Internal event passing</a:t>
+                </a:r>
+                <a:br>
+                  <a:rPr lang="en-US" dirty="0">
+                    <a:latin typeface="Chalkboard SE" panose="03050602040202020205" pitchFamily="66" charset="0"/>
+                  </a:rPr>
+                </a:br>
+                <a:r>
+                  <a:rPr lang="en-US" dirty="0">
+                    <a:latin typeface="Chalkboard SE" panose="03050602040202020205" pitchFamily="66" charset="0"/>
+                  </a:rPr>
+                  <a:t>depends on the call result</a:t>
                 </a:r>
               </a:p>
             </p:txBody>
@@ -4877,29 +4996,28 @@
         </p:grpSp>
         <p:cxnSp>
           <p:nvCxnSpPr>
-            <p:cNvPr id="9" name="曲線コネクタ 8">
+            <p:cNvPr id="12" name="曲線コネクタ 11">
               <a:extLst>
                 <a:ext uri="{FF2B5EF4-FFF2-40B4-BE49-F238E27FC236}">
-                  <a16:creationId xmlns:a16="http://schemas.microsoft.com/office/drawing/2014/main" id="{2DF0A45E-AB45-5C49-9FAA-5C796A26FC15}"/>
+                  <a16:creationId xmlns:a16="http://schemas.microsoft.com/office/drawing/2014/main" id="{33DA5504-1BCF-7E4E-AB9A-C5FD26EF44EF}"/>
                 </a:ext>
               </a:extLst>
             </p:cNvPr>
             <p:cNvCxnSpPr>
               <a:cxnSpLocks/>
-              <a:stCxn id="4" idx="1"/>
-              <a:endCxn id="4" idx="0"/>
+              <a:stCxn id="5" idx="2"/>
             </p:cNvCxnSpPr>
             <p:nvPr/>
           </p:nvCxnSpPr>
           <p:spPr>
-            <a:xfrm rot="10800000" flipH="1">
-              <a:off x="2117034" y="2643809"/>
-              <a:ext cx="1138031" cy="1048578"/>
+            <a:xfrm rot="5400000" flipH="1" flipV="1">
+              <a:off x="6722442" y="3647662"/>
+              <a:ext cx="1048577" cy="1138030"/>
             </a:xfrm>
             <a:prstGeom prst="curvedConnector4">
               <a:avLst>
-                <a:gd name="adj1" fmla="val -20087"/>
-                <a:gd name="adj2" fmla="val 121801"/>
+                <a:gd name="adj1" fmla="val -21801"/>
+                <a:gd name="adj2" fmla="val 142677"/>
               </a:avLst>
             </a:prstGeom>
             <a:ln w="57150">
@@ -4926,10 +5044,10 @@
         </p:cxnSp>
         <p:sp>
           <p:nvSpPr>
-            <p:cNvPr id="13" name="テキスト ボックス 12">
+            <p:cNvPr id="18" name="テキスト ボックス 17">
               <a:extLst>
                 <a:ext uri="{FF2B5EF4-FFF2-40B4-BE49-F238E27FC236}">
-                  <a16:creationId xmlns:a16="http://schemas.microsoft.com/office/drawing/2014/main" id="{D782548A-321B-1746-A73B-FFBE59171969}"/>
+                  <a16:creationId xmlns:a16="http://schemas.microsoft.com/office/drawing/2014/main" id="{A65E2354-7501-CB49-A8BA-1FEB59C7B1E8}"/>
                 </a:ext>
               </a:extLst>
             </p:cNvPr>
@@ -4938,8 +5056,8 @@
           </p:nvSpPr>
           <p:spPr>
             <a:xfrm>
-              <a:off x="653939" y="1685967"/>
-              <a:ext cx="2926187" cy="646331"/>
+              <a:off x="8442823" y="3570346"/>
+              <a:ext cx="2631105" cy="646331"/>
             </a:xfrm>
             <a:prstGeom prst="rect">
               <a:avLst/>
@@ -4957,7 +5075,7 @@
                 <a:rPr lang="en-US" dirty="0">
                   <a:latin typeface="Chalkboard SE" panose="03050602040202020205" pitchFamily="66" charset="0"/>
                 </a:rPr>
-                <a:t>Internal event passing</a:t>
+                <a:t>Modifier converted into</a:t>
               </a:r>
               <a:br>
                 <a:rPr lang="en-US" dirty="0">
@@ -4968,109 +5086,12 @@
                 <a:rPr lang="en-US" dirty="0">
                   <a:latin typeface="Chalkboard SE" panose="03050602040202020205" pitchFamily="66" charset="0"/>
                 </a:rPr>
-                <a:t>depends on the call result</a:t>
+                <a:t>internal event passing</a:t>
               </a:r>
             </a:p>
           </p:txBody>
         </p:sp>
       </p:grpSp>
-      <p:cxnSp>
-        <p:nvCxnSpPr>
-          <p:cNvPr id="12" name="曲線コネクタ 11">
-            <a:extLst>
-              <a:ext uri="{FF2B5EF4-FFF2-40B4-BE49-F238E27FC236}">
-                <a16:creationId xmlns:a16="http://schemas.microsoft.com/office/drawing/2014/main" id="{33DA5504-1BCF-7E4E-AB9A-C5FD26EF44EF}"/>
-              </a:ext>
-            </a:extLst>
-          </p:cNvPr>
-          <p:cNvCxnSpPr>
-            <a:cxnSpLocks/>
-            <a:stCxn id="5" idx="2"/>
-          </p:cNvCxnSpPr>
-          <p:nvPr/>
-        </p:nvCxnSpPr>
-        <p:spPr>
-          <a:xfrm rot="5400000" flipH="1" flipV="1">
-            <a:off x="6722442" y="3647662"/>
-            <a:ext cx="1048577" cy="1138030"/>
-          </a:xfrm>
-          <a:prstGeom prst="curvedConnector4">
-            <a:avLst>
-              <a:gd name="adj1" fmla="val -21801"/>
-              <a:gd name="adj2" fmla="val 142677"/>
-            </a:avLst>
-          </a:prstGeom>
-          <a:ln w="57150">
-            <a:solidFill>
-              <a:schemeClr val="tx2"/>
-            </a:solidFill>
-            <a:tailEnd type="triangle"/>
-          </a:ln>
-        </p:spPr>
-        <p:style>
-          <a:lnRef idx="1">
-            <a:schemeClr val="accent1"/>
-          </a:lnRef>
-          <a:fillRef idx="0">
-            <a:schemeClr val="accent1"/>
-          </a:fillRef>
-          <a:effectRef idx="0">
-            <a:schemeClr val="accent1"/>
-          </a:effectRef>
-          <a:fontRef idx="minor">
-            <a:schemeClr val="tx1"/>
-          </a:fontRef>
-        </p:style>
-      </p:cxnSp>
-      <p:sp>
-        <p:nvSpPr>
-          <p:cNvPr id="18" name="テキスト ボックス 17">
-            <a:extLst>
-              <a:ext uri="{FF2B5EF4-FFF2-40B4-BE49-F238E27FC236}">
-                <a16:creationId xmlns:a16="http://schemas.microsoft.com/office/drawing/2014/main" id="{A65E2354-7501-CB49-A8BA-1FEB59C7B1E8}"/>
-              </a:ext>
-            </a:extLst>
-          </p:cNvPr>
-          <p:cNvSpPr txBox="1"/>
-          <p:nvPr/>
-        </p:nvSpPr>
-        <p:spPr>
-          <a:xfrm>
-            <a:off x="8442823" y="3570346"/>
-            <a:ext cx="2631105" cy="646331"/>
-          </a:xfrm>
-          <a:prstGeom prst="rect">
-            <a:avLst/>
-          </a:prstGeom>
-          <a:noFill/>
-        </p:spPr>
-        <p:txBody>
-          <a:bodyPr wrap="none" rtlCol="0">
-            <a:spAutoFit/>
-          </a:bodyPr>
-          <a:lstStyle/>
-          <a:p>
-            <a:pPr algn="ctr"/>
-            <a:r>
-              <a:rPr lang="en-US" dirty="0">
-                <a:latin typeface="Chalkboard SE" panose="03050602040202020205" pitchFamily="66" charset="0"/>
-              </a:rPr>
-              <a:t>Modifier converted into</a:t>
-            </a:r>
-            <a:br>
-              <a:rPr lang="en-US" dirty="0">
-                <a:latin typeface="Chalkboard SE" panose="03050602040202020205" pitchFamily="66" charset="0"/>
-              </a:rPr>
-            </a:br>
-            <a:r>
-              <a:rPr lang="en-US" dirty="0">
-                <a:latin typeface="Chalkboard SE" panose="03050602040202020205" pitchFamily="66" charset="0"/>
-              </a:rPr>
-              <a:t>internal event passing</a:t>
-            </a:r>
-          </a:p>
-        </p:txBody>
-      </p:sp>
     </p:spTree>
     <p:extLst>
       <p:ext uri="{BB962C8B-B14F-4D97-AF65-F5344CB8AC3E}">

</xml_diff>